<commit_message>
added Chris Peel's latest bank code
</commit_message>
<xml_diff>
--- a/Village Bank.pptx
+++ b/Village Bank.pptx
@@ -33,13 +33,14 @@
     <p:sldId id="283" r:id="rId27"/>
     <p:sldId id="284" r:id="rId28"/>
     <p:sldId id="285" r:id="rId29"/>
-    <p:sldId id="287" r:id="rId30"/>
-    <p:sldId id="288" r:id="rId31"/>
-    <p:sldId id="289" r:id="rId32"/>
-    <p:sldId id="290" r:id="rId33"/>
-    <p:sldId id="291" r:id="rId34"/>
-    <p:sldId id="292" r:id="rId35"/>
-    <p:sldId id="293" r:id="rId36"/>
+    <p:sldId id="297" r:id="rId30"/>
+    <p:sldId id="287" r:id="rId31"/>
+    <p:sldId id="288" r:id="rId32"/>
+    <p:sldId id="289" r:id="rId33"/>
+    <p:sldId id="290" r:id="rId34"/>
+    <p:sldId id="291" r:id="rId35"/>
+    <p:sldId id="292" r:id="rId36"/>
+    <p:sldId id="293" r:id="rId37"/>
   </p:sldIdLst>
   <p:sldSz cx="9144000" cy="6858000" type="screen4x3"/>
   <p:notesSz cx="6858000" cy="9144000"/>
@@ -322,7 +323,7 @@
           <a:p>
             <a:fld id="{4433F56D-27F4-4650-ACBF-F6A2C50FF25D}" type="datetimeFigureOut">
               <a:rPr lang="en-US" smtClean="0"/>
-              <a:t>3/3/2015</a:t>
+              <a:t>3/4/2015</a:t>
             </a:fld>
             <a:endParaRPr lang="en-US"/>
           </a:p>
@@ -492,7 +493,7 @@
           <a:p>
             <a:fld id="{4433F56D-27F4-4650-ACBF-F6A2C50FF25D}" type="datetimeFigureOut">
               <a:rPr lang="en-US" smtClean="0"/>
-              <a:t>3/3/2015</a:t>
+              <a:t>3/4/2015</a:t>
             </a:fld>
             <a:endParaRPr lang="en-US"/>
           </a:p>
@@ -672,7 +673,7 @@
           <a:p>
             <a:fld id="{4433F56D-27F4-4650-ACBF-F6A2C50FF25D}" type="datetimeFigureOut">
               <a:rPr lang="en-US" smtClean="0"/>
-              <a:t>3/3/2015</a:t>
+              <a:t>3/4/2015</a:t>
             </a:fld>
             <a:endParaRPr lang="en-US"/>
           </a:p>
@@ -842,7 +843,7 @@
           <a:p>
             <a:fld id="{4433F56D-27F4-4650-ACBF-F6A2C50FF25D}" type="datetimeFigureOut">
               <a:rPr lang="en-US" smtClean="0"/>
-              <a:t>3/3/2015</a:t>
+              <a:t>3/4/2015</a:t>
             </a:fld>
             <a:endParaRPr lang="en-US"/>
           </a:p>
@@ -1088,7 +1089,7 @@
           <a:p>
             <a:fld id="{4433F56D-27F4-4650-ACBF-F6A2C50FF25D}" type="datetimeFigureOut">
               <a:rPr lang="en-US" smtClean="0"/>
-              <a:t>3/3/2015</a:t>
+              <a:t>3/4/2015</a:t>
             </a:fld>
             <a:endParaRPr lang="en-US"/>
           </a:p>
@@ -1376,7 +1377,7 @@
           <a:p>
             <a:fld id="{4433F56D-27F4-4650-ACBF-F6A2C50FF25D}" type="datetimeFigureOut">
               <a:rPr lang="en-US" smtClean="0"/>
-              <a:t>3/3/2015</a:t>
+              <a:t>3/4/2015</a:t>
             </a:fld>
             <a:endParaRPr lang="en-US"/>
           </a:p>
@@ -1798,7 +1799,7 @@
           <a:p>
             <a:fld id="{4433F56D-27F4-4650-ACBF-F6A2C50FF25D}" type="datetimeFigureOut">
               <a:rPr lang="en-US" smtClean="0"/>
-              <a:t>3/3/2015</a:t>
+              <a:t>3/4/2015</a:t>
             </a:fld>
             <a:endParaRPr lang="en-US"/>
           </a:p>
@@ -1916,7 +1917,7 @@
           <a:p>
             <a:fld id="{4433F56D-27F4-4650-ACBF-F6A2C50FF25D}" type="datetimeFigureOut">
               <a:rPr lang="en-US" smtClean="0"/>
-              <a:t>3/3/2015</a:t>
+              <a:t>3/4/2015</a:t>
             </a:fld>
             <a:endParaRPr lang="en-US"/>
           </a:p>
@@ -2011,7 +2012,7 @@
           <a:p>
             <a:fld id="{4433F56D-27F4-4650-ACBF-F6A2C50FF25D}" type="datetimeFigureOut">
               <a:rPr lang="en-US" smtClean="0"/>
-              <a:t>3/3/2015</a:t>
+              <a:t>3/4/2015</a:t>
             </a:fld>
             <a:endParaRPr lang="en-US"/>
           </a:p>
@@ -2288,7 +2289,7 @@
           <a:p>
             <a:fld id="{4433F56D-27F4-4650-ACBF-F6A2C50FF25D}" type="datetimeFigureOut">
               <a:rPr lang="en-US" smtClean="0"/>
-              <a:t>3/3/2015</a:t>
+              <a:t>3/4/2015</a:t>
             </a:fld>
             <a:endParaRPr lang="en-US"/>
           </a:p>
@@ -2541,7 +2542,7 @@
           <a:p>
             <a:fld id="{4433F56D-27F4-4650-ACBF-F6A2C50FF25D}" type="datetimeFigureOut">
               <a:rPr lang="en-US" smtClean="0"/>
-              <a:t>3/3/2015</a:t>
+              <a:t>3/4/2015</a:t>
             </a:fld>
             <a:endParaRPr lang="en-US"/>
           </a:p>
@@ -2754,7 +2755,7 @@
           <a:p>
             <a:fld id="{4433F56D-27F4-4650-ACBF-F6A2C50FF25D}" type="datetimeFigureOut">
               <a:rPr lang="en-US" smtClean="0"/>
-              <a:t>3/3/2015</a:t>
+              <a:t>3/4/2015</a:t>
             </a:fld>
             <a:endParaRPr lang="en-US"/>
           </a:p>
@@ -3484,11 +3485,7 @@
             </a:r>
             <a:r>
               <a:rPr lang="en-US" dirty="0" smtClean="0"/>
-              <a:t> </a:t>
-            </a:r>
-            <a:r>
-              <a:rPr lang="en-US" dirty="0" smtClean="0"/>
-              <a:t>except global w/crypto</a:t>
+              <a:t> except global w/crypto</a:t>
             </a:r>
           </a:p>
           <a:p>
@@ -6746,72 +6743,154 @@
           <a:bodyPr/>
           <a:lstStyle/>
           <a:p>
-            <a:pPr lvl="0"/>
-            <a:r>
-              <a:rPr lang="en-US" dirty="0"/>
-              <a:t>Goal from </a:t>
+            <a:r>
+              <a:rPr lang="en-US" dirty="0" smtClean="0"/>
+              <a:t>Software Architecture</a:t>
+            </a:r>
+            <a:endParaRPr lang="en-US" dirty="0"/>
+          </a:p>
+        </p:txBody>
+      </p:sp>
+      <p:sp>
+        <p:nvSpPr>
+          <p:cNvPr id="3" name="Content Placeholder 2"/>
+          <p:cNvSpPr>
+            <a:spLocks noGrp="1"/>
+          </p:cNvSpPr>
+          <p:nvPr>
+            <p:ph idx="1"/>
+          </p:nvPr>
+        </p:nvSpPr>
+        <p:spPr/>
+        <p:txBody>
+          <a:bodyPr>
+            <a:normAutofit fontScale="92500"/>
+          </a:bodyPr>
+          <a:lstStyle/>
+          <a:p>
+            <a:pPr marL="971550" lvl="1" indent="-514350">
+              <a:buFont typeface="+mj-lt"/>
+              <a:buAutoNum type="arabicPeriod"/>
+            </a:pPr>
+            <a:r>
+              <a:rPr lang="en-US" dirty="0" smtClean="0"/>
+              <a:t>Account </a:t>
+            </a:r>
+            <a:r>
+              <a:rPr lang="en-US" dirty="0"/>
+              <a:t>structure (savings accounts, loan accounts, pooled bank funds, </a:t>
             </a:r>
             <a:r>
               <a:rPr lang="en-US" dirty="0" err="1"/>
-              <a:t>BlockChainU</a:t>
-            </a:r>
-            <a:r>
-              <a:rPr lang="en-US" dirty="0"/>
-              <a:t> project</a:t>
-            </a:r>
-          </a:p>
-        </p:txBody>
-      </p:sp>
-      <p:sp>
-        <p:nvSpPr>
-          <p:cNvPr id="3" name="Content Placeholder 2"/>
-          <p:cNvSpPr>
-            <a:spLocks noGrp="1"/>
-          </p:cNvSpPr>
-          <p:nvPr>
-            <p:ph idx="1"/>
-          </p:nvPr>
-        </p:nvSpPr>
-        <p:spPr/>
-        <p:txBody>
-          <a:bodyPr/>
-          <a:lstStyle/>
-          <a:p>
-            <a:pPr lvl="1">
-              <a:buFont typeface="Arial" panose="020B0604020202020204" pitchFamily="34" charset="0"/>
-              <a:buChar char="•"/>
-            </a:pPr>
-            <a:r>
-              <a:rPr lang="en-US" dirty="0"/>
-              <a:t>Proof of concept</a:t>
-            </a:r>
-            <a:endParaRPr lang="en-US" sz="2400" dirty="0"/>
-          </a:p>
-          <a:p>
-            <a:pPr lvl="1">
-              <a:buFont typeface="Arial" panose="020B0604020202020204" pitchFamily="34" charset="0"/>
-              <a:buChar char="•"/>
-            </a:pPr>
-            <a:r>
-              <a:rPr lang="en-US" dirty="0"/>
-              <a:t>Need help brainstorming the </a:t>
-            </a:r>
-            <a:r>
-              <a:rPr lang="en-US" dirty="0" err="1"/>
-              <a:t>Ethereum</a:t>
-            </a:r>
-            <a:r>
-              <a:rPr lang="en-US" dirty="0"/>
-              <a:t> architecture of this project &amp; with coding</a:t>
-            </a:r>
-            <a:endParaRPr lang="en-US" sz="2400" dirty="0"/>
+              <a:t>multisig</a:t>
+            </a:r>
+            <a:r>
+              <a:rPr lang="en-US" dirty="0"/>
+              <a:t> social fund)</a:t>
+            </a:r>
+          </a:p>
+          <a:p>
+            <a:pPr marL="1371600" lvl="2" indent="-457200">
+              <a:buFont typeface="+mj-lt"/>
+              <a:buAutoNum type="arabicPeriod"/>
+            </a:pPr>
+            <a:r>
+              <a:rPr lang="en-US" dirty="0"/>
+              <a:t>Interest rate compounding rules</a:t>
+            </a:r>
+          </a:p>
+          <a:p>
+            <a:pPr marL="1371600" lvl="2" indent="-457200">
+              <a:buFont typeface="+mj-lt"/>
+              <a:buAutoNum type="arabicPeriod"/>
+            </a:pPr>
+            <a:r>
+              <a:rPr lang="en-US" dirty="0"/>
+              <a:t>Loan payback </a:t>
+            </a:r>
+            <a:r>
+              <a:rPr lang="en-US" dirty="0" smtClean="0"/>
+              <a:t>periods &amp; penalties</a:t>
+            </a:r>
+          </a:p>
+          <a:p>
+            <a:pPr marL="1371600" lvl="2" indent="-457200">
+              <a:buFont typeface="+mj-lt"/>
+              <a:buAutoNum type="arabicPeriod"/>
+            </a:pPr>
+            <a:r>
+              <a:rPr lang="en-US" dirty="0" smtClean="0"/>
+              <a:t>% of pooled bank funds lent out</a:t>
+            </a:r>
+            <a:endParaRPr lang="en-US" dirty="0"/>
+          </a:p>
+          <a:p>
+            <a:pPr marL="971550" lvl="1" indent="-514350">
+              <a:buFont typeface="+mj-lt"/>
+              <a:buAutoNum type="arabicPeriod"/>
+            </a:pPr>
+            <a:r>
+              <a:rPr lang="en-US" dirty="0" smtClean="0"/>
+              <a:t>ID </a:t>
+            </a:r>
+            <a:r>
+              <a:rPr lang="en-US" dirty="0"/>
+              <a:t>system</a:t>
+            </a:r>
+          </a:p>
+          <a:p>
+            <a:pPr marL="971550" lvl="1" indent="-514350">
+              <a:buFont typeface="+mj-lt"/>
+              <a:buAutoNum type="arabicPeriod"/>
+            </a:pPr>
+            <a:r>
+              <a:rPr lang="en-US" dirty="0" smtClean="0"/>
+              <a:t>Bank </a:t>
+            </a:r>
+            <a:r>
+              <a:rPr lang="en-US" dirty="0"/>
+              <a:t>structure &amp; Voting structure for bank, elders</a:t>
+            </a:r>
+          </a:p>
+          <a:p>
+            <a:pPr marL="971550" lvl="1" indent="-514350">
+              <a:buFont typeface="+mj-lt"/>
+              <a:buAutoNum type="arabicPeriod"/>
+            </a:pPr>
+            <a:r>
+              <a:rPr lang="en-US" dirty="0" smtClean="0"/>
+              <a:t>Voting </a:t>
+            </a:r>
+            <a:r>
+              <a:rPr lang="en-US" dirty="0"/>
+              <a:t>structure for social fund</a:t>
+            </a:r>
+          </a:p>
+          <a:p>
+            <a:pPr marL="971550" lvl="1" indent="-514350">
+              <a:buFont typeface="+mj-lt"/>
+              <a:buAutoNum type="arabicPeriod"/>
+            </a:pPr>
+            <a:r>
+              <a:rPr lang="en-US" dirty="0" smtClean="0"/>
+              <a:t>Bank </a:t>
+            </a:r>
+            <a:r>
+              <a:rPr lang="en-US" dirty="0"/>
+              <a:t>bylaws, how to modify them, framework for the entire </a:t>
+            </a:r>
+            <a:r>
+              <a:rPr lang="en-US" dirty="0" smtClean="0"/>
+              <a:t>system</a:t>
+            </a:r>
+            <a:endParaRPr lang="en-US" dirty="0"/>
           </a:p>
         </p:txBody>
       </p:sp>
     </p:spTree>
     <p:extLst>
       <p:ext uri="{BB962C8B-B14F-4D97-AF65-F5344CB8AC3E}">
-        <p14:creationId xmlns:p14="http://schemas.microsoft.com/office/powerpoint/2010/main" val="2348184418"/>
+        <p14:creationId xmlns:p14="http://schemas.microsoft.com/office/powerpoint/2010/main" val="2303605352"/>
       </p:ext>
     </p:extLst>
   </p:cSld>
@@ -6962,16 +7041,22 @@
         </p:nvSpPr>
         <p:spPr/>
         <p:txBody>
-          <a:bodyPr>
-            <a:normAutofit fontScale="90000"/>
-          </a:bodyPr>
-          <a:lstStyle/>
-          <a:p>
-            <a:r>
-              <a:rPr lang="en-US" dirty="0" smtClean="0"/>
-              <a:t>Village Savings and Loan Association</a:t>
-            </a:r>
-            <a:endParaRPr lang="en-US" dirty="0"/>
+          <a:bodyPr/>
+          <a:lstStyle/>
+          <a:p>
+            <a:pPr lvl="0"/>
+            <a:r>
+              <a:rPr lang="en-US" dirty="0"/>
+              <a:t>Goal from </a:t>
+            </a:r>
+            <a:r>
+              <a:rPr lang="en-US" dirty="0" err="1"/>
+              <a:t>BlockChainU</a:t>
+            </a:r>
+            <a:r>
+              <a:rPr lang="en-US" dirty="0"/>
+              <a:t> project</a:t>
+            </a:r>
           </a:p>
         </p:txBody>
       </p:sp>
@@ -6987,24 +7072,16 @@
         </p:nvSpPr>
         <p:spPr/>
         <p:txBody>
-          <a:bodyPr>
-            <a:normAutofit fontScale="85000" lnSpcReduction="10000"/>
-          </a:bodyPr>
-          <a:lstStyle/>
-          <a:p>
-            <a:pPr lvl="1">
-              <a:buFont typeface="Arial" panose="020B0604020202020204" pitchFamily="34" charset="0"/>
-              <a:buChar char="•"/>
-            </a:pPr>
-            <a:r>
-              <a:rPr lang="en-US" u="sng" dirty="0">
-                <a:hlinkClick r:id="rId2"/>
-              </a:rPr>
-              <a:t>http://www.vsla.net/aboutus/vslmodel</a:t>
-            </a:r>
-            <a:r>
-              <a:rPr lang="en-US" dirty="0"/>
-              <a:t> </a:t>
+          <a:bodyPr/>
+          <a:lstStyle/>
+          <a:p>
+            <a:pPr lvl="1">
+              <a:buFont typeface="Arial" panose="020B0604020202020204" pitchFamily="34" charset="0"/>
+              <a:buChar char="•"/>
+            </a:pPr>
+            <a:r>
+              <a:rPr lang="en-US" dirty="0"/>
+              <a:t>Proof of concept</a:t>
             </a:r>
             <a:endParaRPr lang="en-US" sz="2400" dirty="0"/>
           </a:p>
@@ -7015,22 +7092,15 @@
             </a:pPr>
             <a:r>
               <a:rPr lang="en-US" dirty="0"/>
-              <a:t>A Village Savings and Loan Association (VSLA) is a group of people who save together and take small loans from those savings. The activities of the group run in cycles of one year, after which the accumulated savings and the loan profits are distributed back to members.</a:t>
-            </a:r>
-            <a:endParaRPr lang="en-US" sz="2400" dirty="0"/>
-          </a:p>
-          <a:p>
-            <a:pPr lvl="1">
-              <a:buFont typeface="Arial" panose="020B0604020202020204" pitchFamily="34" charset="0"/>
-              <a:buChar char="•"/>
-            </a:pPr>
-            <a:r>
-              <a:rPr lang="en-US" dirty="0"/>
-              <a:t>Groups usually hold annual elections. The roles and responsibilities of the five-person management committee are clearly defined and highly decentralized. This is to encourage the participation of all members in the operations of the group; and, moreover, to protect the group from being dominated by a single individual</a:t>
-            </a:r>
-            <a:r>
-              <a:rPr lang="en-US" dirty="0" smtClean="0"/>
-              <a:t>.</a:t>
+              <a:t>Need help brainstorming the </a:t>
+            </a:r>
+            <a:r>
+              <a:rPr lang="en-US" dirty="0" err="1"/>
+              <a:t>Ethereum</a:t>
+            </a:r>
+            <a:r>
+              <a:rPr lang="en-US" dirty="0"/>
+              <a:t> architecture of this project &amp; with coding</a:t>
             </a:r>
             <a:endParaRPr lang="en-US" sz="2400" dirty="0"/>
           </a:p>
@@ -7039,7 +7109,7 @@
     </p:spTree>
     <p:extLst>
       <p:ext uri="{BB962C8B-B14F-4D97-AF65-F5344CB8AC3E}">
-        <p14:creationId xmlns:p14="http://schemas.microsoft.com/office/powerpoint/2010/main" val="3210766165"/>
+        <p14:creationId xmlns:p14="http://schemas.microsoft.com/office/powerpoint/2010/main" val="2348184418"/>
       </p:ext>
     </p:extLst>
   </p:cSld>
@@ -7104,7 +7174,7 @@
         <p:spPr/>
         <p:txBody>
           <a:bodyPr>
-            <a:normAutofit lnSpcReduction="10000"/>
+            <a:normAutofit fontScale="85000" lnSpcReduction="10000"/>
           </a:bodyPr>
           <a:lstStyle/>
           <a:p>
@@ -7113,21 +7183,39 @@
               <a:buChar char="•"/>
             </a:pPr>
             <a:r>
-              <a:rPr lang="en-US" sz="2400" dirty="0"/>
-              <a:t>Each group is composed of 15 to 25 self-selected individuals. Groups meet weekly and members save through the purchase of shares. The price of a share is decided by the group. At each meeting, every member must purchase between 1 and 5 shares. The share-price is set by the group at the beginning of the cycle and is fixed for the entire cycle.</a:t>
-            </a:r>
-          </a:p>
-          <a:p>
-            <a:pPr lvl="1">
-              <a:buFont typeface="Arial" panose="020B0604020202020204" pitchFamily="34" charset="0"/>
-              <a:buChar char="•"/>
-            </a:pPr>
-            <a:r>
-              <a:rPr lang="en-US" sz="2400" dirty="0"/>
-              <a:t>Savings are maintained in a loan fund from which members can borrow in small amounts, up to three times their individual savings. Loans are for a maximum period of three months in the first year and loans may be repaid in flexible installments at a monthly service charge determined by the group</a:t>
-            </a:r>
-            <a:r>
-              <a:rPr lang="en-US" sz="2400" dirty="0" smtClean="0"/>
+              <a:rPr lang="en-US" u="sng" dirty="0">
+                <a:hlinkClick r:id="rId2"/>
+              </a:rPr>
+              <a:t>http://www.vsla.net/aboutus/vslmodel</a:t>
+            </a:r>
+            <a:r>
+              <a:rPr lang="en-US" dirty="0"/>
+              <a:t> </a:t>
+            </a:r>
+            <a:endParaRPr lang="en-US" sz="2400" dirty="0"/>
+          </a:p>
+          <a:p>
+            <a:pPr lvl="1">
+              <a:buFont typeface="Arial" panose="020B0604020202020204" pitchFamily="34" charset="0"/>
+              <a:buChar char="•"/>
+            </a:pPr>
+            <a:r>
+              <a:rPr lang="en-US" dirty="0"/>
+              <a:t>A Village Savings and Loan Association (VSLA) is a group of people who save together and take small loans from those savings. The activities of the group run in cycles of one year, after which the accumulated savings and the loan profits are distributed back to members.</a:t>
+            </a:r>
+            <a:endParaRPr lang="en-US" sz="2400" dirty="0"/>
+          </a:p>
+          <a:p>
+            <a:pPr lvl="1">
+              <a:buFont typeface="Arial" panose="020B0604020202020204" pitchFamily="34" charset="0"/>
+              <a:buChar char="•"/>
+            </a:pPr>
+            <a:r>
+              <a:rPr lang="en-US" dirty="0"/>
+              <a:t>Groups usually hold annual elections. The roles and responsibilities of the five-person management committee are clearly defined and highly decentralized. This is to encourage the participation of all members in the operations of the group; and, moreover, to protect the group from being dominated by a single individual</a:t>
+            </a:r>
+            <a:r>
+              <a:rPr lang="en-US" dirty="0" smtClean="0"/>
               <a:t>.</a:t>
             </a:r>
             <a:endParaRPr lang="en-US" sz="2400" dirty="0"/>
@@ -7137,7 +7225,7 @@
     </p:spTree>
     <p:extLst>
       <p:ext uri="{BB962C8B-B14F-4D97-AF65-F5344CB8AC3E}">
-        <p14:creationId xmlns:p14="http://schemas.microsoft.com/office/powerpoint/2010/main" val="1346212398"/>
+        <p14:creationId xmlns:p14="http://schemas.microsoft.com/office/powerpoint/2010/main" val="3210766165"/>
       </p:ext>
     </p:extLst>
   </p:cSld>
@@ -7202,7 +7290,7 @@
         <p:spPr/>
         <p:txBody>
           <a:bodyPr>
-            <a:normAutofit fontScale="92500" lnSpcReduction="20000"/>
+            <a:normAutofit lnSpcReduction="10000"/>
           </a:bodyPr>
           <a:lstStyle/>
           <a:p>
@@ -7211,26 +7299,21 @@
               <a:buChar char="•"/>
             </a:pPr>
             <a:r>
-              <a:rPr lang="en-US" dirty="0" smtClean="0"/>
-              <a:t>Each </a:t>
-            </a:r>
-            <a:r>
-              <a:rPr lang="en-US" dirty="0"/>
-              <a:t>group may also have a social fund, which provides members a basic form of insurance. The social fund serves as a community safety net and may serve a number of purposes – such as emergency assistance, festivals and funeral expenses – for the entire community, including group members and non-members.</a:t>
-            </a:r>
-            <a:endParaRPr lang="en-US" sz="2400" dirty="0"/>
-          </a:p>
-          <a:p>
-            <a:pPr lvl="1">
-              <a:buFont typeface="Arial" panose="020B0604020202020204" pitchFamily="34" charset="0"/>
-              <a:buChar char="•"/>
-            </a:pPr>
-            <a:r>
-              <a:rPr lang="en-US" dirty="0"/>
-              <a:t>Each group agrees upon a contribution made by all members at every meeting. The social fund is not intended to grow, but to be set at a level that covers basic insurance needs. It is not distributed back to the members at the end of the annual cycle, but remains a group asset</a:t>
-            </a:r>
-            <a:r>
-              <a:rPr lang="en-US" dirty="0" smtClean="0"/>
+              <a:rPr lang="en-US" sz="2400" dirty="0"/>
+              <a:t>Each group is composed of 15 to 25 self-selected individuals. Groups meet weekly and members save through the purchase of shares. The price of a share is decided by the group. At each meeting, every member must purchase between 1 and 5 shares. The share-price is set by the group at the beginning of the cycle and is fixed for the entire cycle.</a:t>
+            </a:r>
+          </a:p>
+          <a:p>
+            <a:pPr lvl="1">
+              <a:buFont typeface="Arial" panose="020B0604020202020204" pitchFamily="34" charset="0"/>
+              <a:buChar char="•"/>
+            </a:pPr>
+            <a:r>
+              <a:rPr lang="en-US" sz="2400" dirty="0"/>
+              <a:t>Savings are maintained in a loan fund from which members can borrow in small amounts, up to three times their individual savings. Loans are for a maximum period of three months in the first year and loans may be repaid in flexible installments at a monthly service charge determined by the group</a:t>
+            </a:r>
+            <a:r>
+              <a:rPr lang="en-US" sz="2400" dirty="0" smtClean="0"/>
               <a:t>.</a:t>
             </a:r>
             <a:endParaRPr lang="en-US" sz="2400" dirty="0"/>
@@ -7240,7 +7323,7 @@
     </p:spTree>
     <p:extLst>
       <p:ext uri="{BB962C8B-B14F-4D97-AF65-F5344CB8AC3E}">
-        <p14:creationId xmlns:p14="http://schemas.microsoft.com/office/powerpoint/2010/main" val="1058912925"/>
+        <p14:creationId xmlns:p14="http://schemas.microsoft.com/office/powerpoint/2010/main" val="1346212398"/>
       </p:ext>
     </p:extLst>
   </p:cSld>
@@ -7305,7 +7388,7 @@
         <p:spPr/>
         <p:txBody>
           <a:bodyPr>
-            <a:normAutofit fontScale="77500" lnSpcReduction="20000"/>
+            <a:normAutofit fontScale="92500" lnSpcReduction="20000"/>
           </a:bodyPr>
           <a:lstStyle/>
           <a:p>
@@ -7314,8 +7397,12 @@
               <a:buChar char="•"/>
             </a:pPr>
             <a:r>
-              <a:rPr lang="en-US" dirty="0"/>
-              <a:t>The materials, passbooks, loan fund and social fund of the VSLA are maintained in a lock-box, which is safeguarded by the group box-keeper between meetings. The lock-box has three padlocks and the keys are held by three members of the group who are not members of the Management Committee. The system is robust and ensures that there can be no manipulation of the group’s passbooks or funds outside of group meetings.</a:t>
+              <a:rPr lang="en-US" dirty="0" smtClean="0"/>
+              <a:t>Each </a:t>
+            </a:r>
+            <a:r>
+              <a:rPr lang="en-US" dirty="0"/>
+              <a:t>group may also have a social fund, which provides members a basic form of insurance. The social fund serves as a community safety net and may serve a number of purposes – such as emergency assistance, festivals and funeral expenses – for the entire community, including group members and non-members.</a:t>
             </a:r>
             <a:endParaRPr lang="en-US" sz="2400" dirty="0"/>
           </a:p>
@@ -7326,7 +7413,7 @@
             </a:pPr>
             <a:r>
               <a:rPr lang="en-US" dirty="0"/>
-              <a:t>Groups operate in annual cycles. At the end of every cycle, the accumulated savings plus service charge earnings are shared out amongst the membership according to the amount each member has saved. The annual share-out resolves any outstanding issues and builds member confidence. It is an action audit that provides an immediate verification to all members that their money is safe and the process is profitable</a:t>
+              <a:t>Each group agrees upon a contribution made by all members at every meeting. The social fund is not intended to grow, but to be set at a level that covers basic insurance needs. It is not distributed back to the members at the end of the annual cycle, but remains a group asset</a:t>
             </a:r>
             <a:r>
               <a:rPr lang="en-US" dirty="0" smtClean="0"/>
@@ -7339,7 +7426,7 @@
     </p:spTree>
     <p:extLst>
       <p:ext uri="{BB962C8B-B14F-4D97-AF65-F5344CB8AC3E}">
-        <p14:creationId xmlns:p14="http://schemas.microsoft.com/office/powerpoint/2010/main" val="915905306"/>
+        <p14:creationId xmlns:p14="http://schemas.microsoft.com/office/powerpoint/2010/main" val="1058912925"/>
       </p:ext>
     </p:extLst>
   </p:cSld>
@@ -7404,28 +7491,28 @@
         <p:spPr/>
         <p:txBody>
           <a:bodyPr>
-            <a:normAutofit fontScale="85000" lnSpcReduction="20000"/>
+            <a:normAutofit fontScale="77500" lnSpcReduction="20000"/>
           </a:bodyPr>
           <a:lstStyle/>
           <a:p>
-            <a:pPr marL="342900" lvl="1" indent="-342900">
-              <a:buFont typeface="Arial" panose="020B0604020202020204" pitchFamily="34" charset="0"/>
-              <a:buChar char="•"/>
-            </a:pPr>
-            <a:r>
-              <a:rPr lang="en-US" dirty="0" smtClean="0"/>
-              <a:t>After the share-out, members who do not wish to continue may leave the group and new members may be invited to join. Members who plan to continue to the next cycle may all agree to use some of their savings to make a contribution to the loan fund for the next cycle. This initiates lending activities with a useful amount of money on hand.</a:t>
-            </a:r>
-            <a:endParaRPr lang="en-US" sz="2400" dirty="0" smtClean="0"/>
-          </a:p>
-          <a:p>
-            <a:pPr marL="342900" lvl="1" indent="-342900">
-              <a:buFont typeface="Arial" panose="020B0604020202020204" pitchFamily="34" charset="0"/>
-              <a:buChar char="•"/>
-            </a:pPr>
-            <a:r>
-              <a:rPr lang="en-US" dirty="0"/>
-              <a:t>When a new cycle begins, members conduct new elections, review their constitution and may make changes to the terms and conditions that apply to savings, lending and the social fund. They may, for example, agree to change the social fund contribution, share price and the monthly loan service charge. However, the share value and loan service charge can never be changed during the cycle. After this process the group then continues to operate independently in its second cycle</a:t>
+            <a:pPr lvl="1">
+              <a:buFont typeface="Arial" panose="020B0604020202020204" pitchFamily="34" charset="0"/>
+              <a:buChar char="•"/>
+            </a:pPr>
+            <a:r>
+              <a:rPr lang="en-US" dirty="0"/>
+              <a:t>The materials, passbooks, loan fund and social fund of the VSLA are maintained in a lock-box, which is safeguarded by the group box-keeper between meetings. The lock-box has three padlocks and the keys are held by three members of the group who are not members of the Management Committee. The system is robust and ensures that there can be no manipulation of the group’s passbooks or funds outside of group meetings.</a:t>
+            </a:r>
+            <a:endParaRPr lang="en-US" sz="2400" dirty="0"/>
+          </a:p>
+          <a:p>
+            <a:pPr lvl="1">
+              <a:buFont typeface="Arial" panose="020B0604020202020204" pitchFamily="34" charset="0"/>
+              <a:buChar char="•"/>
+            </a:pPr>
+            <a:r>
+              <a:rPr lang="en-US" dirty="0"/>
+              <a:t>Groups operate in annual cycles. At the end of every cycle, the accumulated savings plus service charge earnings are shared out amongst the membership according to the amount each member has saved. The annual share-out resolves any outstanding issues and builds member confidence. It is an action audit that provides an immediate verification to all members that their money is safe and the process is profitable</a:t>
             </a:r>
             <a:r>
               <a:rPr lang="en-US" dirty="0" smtClean="0"/>
@@ -7438,7 +7525,7 @@
     </p:spTree>
     <p:extLst>
       <p:ext uri="{BB962C8B-B14F-4D97-AF65-F5344CB8AC3E}">
-        <p14:creationId xmlns:p14="http://schemas.microsoft.com/office/powerpoint/2010/main" val="2453436306"/>
+        <p14:creationId xmlns:p14="http://schemas.microsoft.com/office/powerpoint/2010/main" val="915905306"/>
       </p:ext>
     </p:extLst>
   </p:cSld>
@@ -7477,6 +7564,105 @@
         </p:nvSpPr>
         <p:spPr/>
         <p:txBody>
+          <a:bodyPr>
+            <a:normAutofit fontScale="90000"/>
+          </a:bodyPr>
+          <a:lstStyle/>
+          <a:p>
+            <a:r>
+              <a:rPr lang="en-US" dirty="0" smtClean="0"/>
+              <a:t>Village Savings and Loan Association</a:t>
+            </a:r>
+            <a:endParaRPr lang="en-US" dirty="0"/>
+          </a:p>
+        </p:txBody>
+      </p:sp>
+      <p:sp>
+        <p:nvSpPr>
+          <p:cNvPr id="3" name="Content Placeholder 2"/>
+          <p:cNvSpPr>
+            <a:spLocks noGrp="1"/>
+          </p:cNvSpPr>
+          <p:nvPr>
+            <p:ph idx="1"/>
+          </p:nvPr>
+        </p:nvSpPr>
+        <p:spPr/>
+        <p:txBody>
+          <a:bodyPr>
+            <a:normAutofit fontScale="85000" lnSpcReduction="20000"/>
+          </a:bodyPr>
+          <a:lstStyle/>
+          <a:p>
+            <a:pPr marL="342900" lvl="1" indent="-342900">
+              <a:buFont typeface="Arial" panose="020B0604020202020204" pitchFamily="34" charset="0"/>
+              <a:buChar char="•"/>
+            </a:pPr>
+            <a:r>
+              <a:rPr lang="en-US" dirty="0" smtClean="0"/>
+              <a:t>After the share-out, members who do not wish to continue may leave the group and new members may be invited to join. Members who plan to continue to the next cycle may all agree to use some of their savings to make a contribution to the loan fund for the next cycle. This initiates lending activities with a useful amount of money on hand.</a:t>
+            </a:r>
+            <a:endParaRPr lang="en-US" sz="2400" dirty="0" smtClean="0"/>
+          </a:p>
+          <a:p>
+            <a:pPr marL="342900" lvl="1" indent="-342900">
+              <a:buFont typeface="Arial" panose="020B0604020202020204" pitchFamily="34" charset="0"/>
+              <a:buChar char="•"/>
+            </a:pPr>
+            <a:r>
+              <a:rPr lang="en-US" dirty="0"/>
+              <a:t>When a new cycle begins, members conduct new elections, review their constitution and may make changes to the terms and conditions that apply to savings, lending and the social fund. They may, for example, agree to change the social fund contribution, share price and the monthly loan service charge. However, the share value and loan service charge can never be changed during the cycle. After this process the group then continues to operate independently in its second cycle</a:t>
+            </a:r>
+            <a:r>
+              <a:rPr lang="en-US" dirty="0" smtClean="0"/>
+              <a:t>.</a:t>
+            </a:r>
+            <a:endParaRPr lang="en-US" sz="2400" dirty="0"/>
+          </a:p>
+        </p:txBody>
+      </p:sp>
+    </p:spTree>
+    <p:extLst>
+      <p:ext uri="{BB962C8B-B14F-4D97-AF65-F5344CB8AC3E}">
+        <p14:creationId xmlns:p14="http://schemas.microsoft.com/office/powerpoint/2010/main" val="2453436306"/>
+      </p:ext>
+    </p:extLst>
+  </p:cSld>
+  <p:clrMapOvr>
+    <a:masterClrMapping/>
+  </p:clrMapOvr>
+</p:sld>
+</file>
+
+<file path=ppt/slides/slide36.xml><?xml version="1.0" encoding="utf-8"?>
+<p:sld xmlns:a="http://schemas.openxmlformats.org/drawingml/2006/main" xmlns:r="http://schemas.openxmlformats.org/officeDocument/2006/relationships" xmlns:p="http://schemas.openxmlformats.org/presentationml/2006/main">
+  <p:cSld>
+    <p:spTree>
+      <p:nvGrpSpPr>
+        <p:cNvPr id="1" name=""/>
+        <p:cNvGrpSpPr/>
+        <p:nvPr/>
+      </p:nvGrpSpPr>
+      <p:grpSpPr>
+        <a:xfrm>
+          <a:off x="0" y="0"/>
+          <a:ext cx="0" cy="0"/>
+          <a:chOff x="0" y="0"/>
+          <a:chExt cx="0" cy="0"/>
+        </a:xfrm>
+      </p:grpSpPr>
+      <p:sp>
+        <p:nvSpPr>
+          <p:cNvPr id="2" name="Title 1"/>
+          <p:cNvSpPr>
+            <a:spLocks noGrp="1"/>
+          </p:cNvSpPr>
+          <p:nvPr>
+            <p:ph type="title"/>
+          </p:nvPr>
+        </p:nvSpPr>
+        <p:spPr/>
+        <p:txBody>
           <a:bodyPr/>
           <a:lstStyle/>
           <a:p>
@@ -7501,7 +7687,7 @@
         <p:spPr/>
         <p:txBody>
           <a:bodyPr>
-            <a:normAutofit fontScale="92500"/>
+            <a:normAutofit fontScale="92500" lnSpcReduction="10000"/>
           </a:bodyPr>
           <a:lstStyle/>
           <a:p>
@@ -7593,16 +7779,35 @@
           <a:p>
             <a:pPr lvl="1"/>
             <a:r>
-              <a:rPr lang="en-US" sz="2400">
+              <a:rPr lang="en-US" sz="2400" dirty="0">
                 <a:hlinkClick r:id="rId8"/>
               </a:rPr>
               <a:t>http://</a:t>
             </a:r>
             <a:r>
-              <a:rPr lang="en-US" sz="2400" smtClean="0">
+              <a:rPr lang="en-US" sz="2400" dirty="0" smtClean="0">
                 <a:hlinkClick r:id="rId8"/>
               </a:rPr>
               <a:t>insights.careinternational.org.uk/publications/banking-on-change-breaking-the-barriers-to-financial-inclusion</a:t>
+            </a:r>
+            <a:r>
+              <a:rPr lang="en-US" sz="2400" dirty="0" smtClean="0"/>
+              <a:t> </a:t>
+            </a:r>
+          </a:p>
+          <a:p>
+            <a:pPr lvl="1"/>
+            <a:r>
+              <a:rPr lang="en-US" sz="2400">
+                <a:hlinkClick r:id="rId9"/>
+              </a:rPr>
+              <a:t>https://</a:t>
+            </a:r>
+            <a:r>
+              <a:rPr lang="en-US" sz="2400" smtClean="0">
+                <a:hlinkClick r:id="rId9"/>
+              </a:rPr>
+              <a:t>letstalkbitcoin.com/blog/post/bitcoin-in-africa</a:t>
             </a:r>
             <a:r>
               <a:rPr lang="en-US" sz="2400" smtClean="0"/>
@@ -8161,11 +8366,7 @@
             <a:pPr lvl="2"/>
             <a:r>
               <a:rPr lang="en-US" dirty="0" smtClean="0"/>
-              <a:t>Loans g</a:t>
-            </a:r>
-            <a:r>
-              <a:rPr lang="en-US" dirty="0" smtClean="0"/>
-              <a:t>ive </a:t>
+              <a:t>Loans give </a:t>
             </a:r>
             <a:r>
               <a:rPr lang="en-US" dirty="0"/>

</xml_diff>

<commit_message>
updated powerpoint w/SW arch
</commit_message>
<xml_diff>
--- a/Village Bank.pptx
+++ b/Village Bank.pptx
@@ -323,7 +323,7 @@
           <a:p>
             <a:fld id="{4433F56D-27F4-4650-ACBF-F6A2C50FF25D}" type="datetimeFigureOut">
               <a:rPr lang="en-US" smtClean="0"/>
-              <a:t>3/4/2015</a:t>
+              <a:t>3/5/2015</a:t>
             </a:fld>
             <a:endParaRPr lang="en-US"/>
           </a:p>
@@ -493,7 +493,7 @@
           <a:p>
             <a:fld id="{4433F56D-27F4-4650-ACBF-F6A2C50FF25D}" type="datetimeFigureOut">
               <a:rPr lang="en-US" smtClean="0"/>
-              <a:t>3/4/2015</a:t>
+              <a:t>3/5/2015</a:t>
             </a:fld>
             <a:endParaRPr lang="en-US"/>
           </a:p>
@@ -673,7 +673,7 @@
           <a:p>
             <a:fld id="{4433F56D-27F4-4650-ACBF-F6A2C50FF25D}" type="datetimeFigureOut">
               <a:rPr lang="en-US" smtClean="0"/>
-              <a:t>3/4/2015</a:t>
+              <a:t>3/5/2015</a:t>
             </a:fld>
             <a:endParaRPr lang="en-US"/>
           </a:p>
@@ -843,7 +843,7 @@
           <a:p>
             <a:fld id="{4433F56D-27F4-4650-ACBF-F6A2C50FF25D}" type="datetimeFigureOut">
               <a:rPr lang="en-US" smtClean="0"/>
-              <a:t>3/4/2015</a:t>
+              <a:t>3/5/2015</a:t>
             </a:fld>
             <a:endParaRPr lang="en-US"/>
           </a:p>
@@ -1089,7 +1089,7 @@
           <a:p>
             <a:fld id="{4433F56D-27F4-4650-ACBF-F6A2C50FF25D}" type="datetimeFigureOut">
               <a:rPr lang="en-US" smtClean="0"/>
-              <a:t>3/4/2015</a:t>
+              <a:t>3/5/2015</a:t>
             </a:fld>
             <a:endParaRPr lang="en-US"/>
           </a:p>
@@ -1377,7 +1377,7 @@
           <a:p>
             <a:fld id="{4433F56D-27F4-4650-ACBF-F6A2C50FF25D}" type="datetimeFigureOut">
               <a:rPr lang="en-US" smtClean="0"/>
-              <a:t>3/4/2015</a:t>
+              <a:t>3/5/2015</a:t>
             </a:fld>
             <a:endParaRPr lang="en-US"/>
           </a:p>
@@ -1799,7 +1799,7 @@
           <a:p>
             <a:fld id="{4433F56D-27F4-4650-ACBF-F6A2C50FF25D}" type="datetimeFigureOut">
               <a:rPr lang="en-US" smtClean="0"/>
-              <a:t>3/4/2015</a:t>
+              <a:t>3/5/2015</a:t>
             </a:fld>
             <a:endParaRPr lang="en-US"/>
           </a:p>
@@ -1917,7 +1917,7 @@
           <a:p>
             <a:fld id="{4433F56D-27F4-4650-ACBF-F6A2C50FF25D}" type="datetimeFigureOut">
               <a:rPr lang="en-US" smtClean="0"/>
-              <a:t>3/4/2015</a:t>
+              <a:t>3/5/2015</a:t>
             </a:fld>
             <a:endParaRPr lang="en-US"/>
           </a:p>
@@ -2012,7 +2012,7 @@
           <a:p>
             <a:fld id="{4433F56D-27F4-4650-ACBF-F6A2C50FF25D}" type="datetimeFigureOut">
               <a:rPr lang="en-US" smtClean="0"/>
-              <a:t>3/4/2015</a:t>
+              <a:t>3/5/2015</a:t>
             </a:fld>
             <a:endParaRPr lang="en-US"/>
           </a:p>
@@ -2289,7 +2289,7 @@
           <a:p>
             <a:fld id="{4433F56D-27F4-4650-ACBF-F6A2C50FF25D}" type="datetimeFigureOut">
               <a:rPr lang="en-US" smtClean="0"/>
-              <a:t>3/4/2015</a:t>
+              <a:t>3/5/2015</a:t>
             </a:fld>
             <a:endParaRPr lang="en-US"/>
           </a:p>
@@ -2542,7 +2542,7 @@
           <a:p>
             <a:fld id="{4433F56D-27F4-4650-ACBF-F6A2C50FF25D}" type="datetimeFigureOut">
               <a:rPr lang="en-US" smtClean="0"/>
-              <a:t>3/4/2015</a:t>
+              <a:t>3/5/2015</a:t>
             </a:fld>
             <a:endParaRPr lang="en-US"/>
           </a:p>
@@ -2755,7 +2755,7 @@
           <a:p>
             <a:fld id="{4433F56D-27F4-4650-ACBF-F6A2C50FF25D}" type="datetimeFigureOut">
               <a:rPr lang="en-US" smtClean="0"/>
-              <a:t>3/4/2015</a:t>
+              <a:t>3/5/2015</a:t>
             </a:fld>
             <a:endParaRPr lang="en-US"/>
           </a:p>
@@ -3165,14 +3165,52 @@
         </p:nvSpPr>
         <p:spPr/>
         <p:txBody>
-          <a:bodyPr/>
-          <a:lstStyle/>
+          <a:bodyPr>
+            <a:normAutofit fontScale="70000" lnSpcReduction="20000"/>
+          </a:bodyPr>
+          <a:lstStyle/>
+          <a:p>
+            <a:r>
+              <a:rPr lang="en-US" dirty="0"/>
+              <a:t>Tyler </a:t>
+            </a:r>
+            <a:r>
+              <a:rPr lang="en-US" dirty="0" err="1"/>
+              <a:t>Florez</a:t>
+            </a:r>
+            <a:endParaRPr lang="en-US" dirty="0"/>
+          </a:p>
+          <a:p>
+            <a:r>
+              <a:rPr lang="en-US" dirty="0"/>
+              <a:t>Jason </a:t>
+            </a:r>
+            <a:r>
+              <a:rPr lang="en-US" dirty="0" err="1"/>
+              <a:t>Jiaxin</a:t>
+            </a:r>
+            <a:r>
+              <a:rPr lang="en-US" dirty="0"/>
+              <a:t> Han</a:t>
+            </a:r>
+          </a:p>
           <a:p>
             <a:r>
               <a:rPr lang="en-US" dirty="0" smtClean="0"/>
               <a:t>Huang Pan</a:t>
             </a:r>
-            <a:endParaRPr lang="en-US" dirty="0"/>
+          </a:p>
+          <a:p>
+            <a:r>
+              <a:rPr lang="en-US" dirty="0"/>
+              <a:t>Kumar Pandey</a:t>
+            </a:r>
+          </a:p>
+          <a:p>
+            <a:r>
+              <a:rPr lang="en-US" dirty="0" smtClean="0"/>
+              <a:t>Christian Peel</a:t>
+            </a:r>
           </a:p>
         </p:txBody>
       </p:sp>
@@ -4878,7 +4916,7 @@
         <p:spPr/>
         <p:txBody>
           <a:bodyPr>
-            <a:normAutofit fontScale="92500" lnSpcReduction="20000"/>
+            <a:noAutofit/>
           </a:bodyPr>
           <a:lstStyle/>
           <a:p>
@@ -4887,60 +4925,43 @@
               <a:buChar char="•"/>
             </a:pPr>
             <a:r>
-              <a:rPr lang="en-US" u="sng" dirty="0">
+              <a:rPr lang="en-US" sz="2400" u="sng" dirty="0">
                 <a:hlinkClick r:id="rId2"/>
               </a:rPr>
               <a:t>https://www.youtube.com/watch?v=5_gwLrd_Lss</a:t>
             </a:r>
             <a:r>
-              <a:rPr lang="en-US" dirty="0"/>
+              <a:rPr lang="en-US" sz="2400" dirty="0"/>
               <a:t> </a:t>
             </a:r>
-            <a:endParaRPr lang="en-US" sz="2400" dirty="0"/>
-          </a:p>
-          <a:p>
-            <a:pPr lvl="1">
-              <a:buFont typeface="Arial" panose="020B0604020202020204" pitchFamily="34" charset="0"/>
-              <a:buChar char="•"/>
-            </a:pPr>
-            <a:r>
-              <a:rPr lang="en-US" dirty="0"/>
+          </a:p>
+          <a:p>
+            <a:pPr lvl="1">
+              <a:buFont typeface="Arial" panose="020B0604020202020204" pitchFamily="34" charset="0"/>
+              <a:buChar char="•"/>
+            </a:pPr>
+            <a:r>
+              <a:rPr lang="en-US" sz="2400" dirty="0"/>
               <a:t>Early village banking methods were innovated by </a:t>
             </a:r>
             <a:r>
-              <a:rPr lang="en-US" dirty="0" err="1"/>
+              <a:rPr lang="en-US" sz="2400" dirty="0" err="1"/>
               <a:t>Grameen</a:t>
             </a:r>
             <a:r>
-              <a:rPr lang="en-US" dirty="0"/>
+              <a:rPr lang="en-US" sz="2400" dirty="0"/>
               <a:t> Bank and then later developed by groups such as FINCA</a:t>
             </a:r>
-            <a:endParaRPr lang="en-US" sz="2400" dirty="0"/>
-          </a:p>
-          <a:p>
-            <a:pPr lvl="1">
-              <a:buFont typeface="Arial" panose="020B0604020202020204" pitchFamily="34" charset="0"/>
-              <a:buChar char="•"/>
-            </a:pPr>
-            <a:r>
-              <a:rPr lang="en-US" dirty="0"/>
+          </a:p>
+          <a:p>
+            <a:pPr lvl="1">
+              <a:buFont typeface="Arial" panose="020B0604020202020204" pitchFamily="34" charset="0"/>
+              <a:buChar char="•"/>
+            </a:pPr>
+            <a:r>
+              <a:rPr lang="en-US" sz="2400" dirty="0"/>
               <a:t>At least 31 microfinance institutions (MFIs) that have collectively created over 800 village banking programs in at least 90 countries</a:t>
             </a:r>
-            <a:endParaRPr lang="en-US" sz="2400" dirty="0"/>
-          </a:p>
-          <a:p>
-            <a:pPr lvl="1">
-              <a:buFont typeface="Arial" panose="020B0604020202020204" pitchFamily="34" charset="0"/>
-              <a:buChar char="•"/>
-            </a:pPr>
-            <a:r>
-              <a:rPr lang="en-US" dirty="0"/>
-              <a:t>A village bank is an informal self-help support group of 20-30 members, predominantly female </a:t>
-            </a:r>
-            <a:r>
-              <a:rPr lang="en-US" dirty="0" smtClean="0"/>
-              <a:t>heads-of-household</a:t>
-            </a:r>
           </a:p>
           <a:p>
             <a:pPr lvl="1">
@@ -4949,36 +4970,23 @@
             </a:pPr>
             <a:r>
               <a:rPr lang="en-US" sz="2400" dirty="0"/>
-              <a:t>W</a:t>
-            </a:r>
-            <a:r>
-              <a:rPr lang="en-US" sz="2400" dirty="0" smtClean="0"/>
-              <a:t>omen </a:t>
-            </a:r>
+              <a:t>A village bank is an informal self-help support group of 20-30 members, predominantly female heads-of-household</a:t>
+            </a:r>
+          </a:p>
+          <a:p>
+            <a:pPr lvl="1">
+              <a:buFont typeface="Arial" panose="020B0604020202020204" pitchFamily="34" charset="0"/>
+              <a:buChar char="•"/>
+            </a:pPr>
             <a:r>
               <a:rPr lang="en-US" sz="2400" dirty="0"/>
-              <a:t>reinvest up to 90 </a:t>
-            </a:r>
-            <a:r>
-              <a:rPr lang="en-US" sz="2400" dirty="0" smtClean="0"/>
-              <a:t>% </a:t>
-            </a:r>
-            <a:r>
-              <a:rPr lang="en-US" sz="2400" dirty="0"/>
-              <a:t>of their income in their families, compared with 30 to 40 </a:t>
-            </a:r>
-            <a:r>
-              <a:rPr lang="en-US" sz="2400" dirty="0" smtClean="0"/>
-              <a:t>% </a:t>
-            </a:r>
-            <a:r>
-              <a:rPr lang="en-US" sz="2400" dirty="0"/>
-              <a:t>by </a:t>
+              <a:t>Women reinvest up to 90 % of their income in their families, compared with 30 to 40 % by </a:t>
             </a:r>
             <a:r>
               <a:rPr lang="en-US" sz="2400" dirty="0" smtClean="0"/>
               <a:t>men</a:t>
             </a:r>
+            <a:endParaRPr lang="en-US" sz="2400" dirty="0"/>
           </a:p>
         </p:txBody>
       </p:sp>
@@ -6764,7 +6772,7 @@
         <p:spPr/>
         <p:txBody>
           <a:bodyPr>
-            <a:normAutofit fontScale="92500"/>
+            <a:normAutofit fontScale="85000" lnSpcReduction="20000"/>
           </a:bodyPr>
           <a:lstStyle/>
           <a:p>
@@ -6774,6 +6782,40 @@
             </a:pPr>
             <a:r>
               <a:rPr lang="en-US" dirty="0" smtClean="0"/>
+              <a:t>HTML/</a:t>
+            </a:r>
+            <a:r>
+              <a:rPr lang="en-US" dirty="0" err="1" smtClean="0"/>
+              <a:t>Javascript</a:t>
+            </a:r>
+            <a:r>
+              <a:rPr lang="en-US" dirty="0" smtClean="0"/>
+              <a:t> front end, </a:t>
+            </a:r>
+            <a:r>
+              <a:rPr lang="en-US" dirty="0" err="1" smtClean="0"/>
+              <a:t>Ethereum</a:t>
+            </a:r>
+            <a:r>
+              <a:rPr lang="en-US" dirty="0" smtClean="0"/>
+              <a:t>/IPFS? </a:t>
+            </a:r>
+            <a:r>
+              <a:rPr lang="en-US" dirty="0"/>
+              <a:t>b</a:t>
+            </a:r>
+            <a:r>
+              <a:rPr lang="en-US" dirty="0" smtClean="0"/>
+              <a:t>ack end</a:t>
+            </a:r>
+          </a:p>
+          <a:p>
+            <a:pPr marL="971550" lvl="1" indent="-514350">
+              <a:buFont typeface="+mj-lt"/>
+              <a:buAutoNum type="arabicPeriod"/>
+            </a:pPr>
+            <a:r>
+              <a:rPr lang="en-US" dirty="0" smtClean="0"/>
               <a:t>Account </a:t>
             </a:r>
             <a:r>
@@ -6810,8 +6852,13 @@
             </a:r>
             <a:r>
               <a:rPr lang="en-US" dirty="0" smtClean="0"/>
-              <a:t>periods &amp; penalties</a:t>
-            </a:r>
+              <a:t>periods &amp; </a:t>
+            </a:r>
+            <a:r>
+              <a:rPr lang="en-US" dirty="0" smtClean="0"/>
+              <a:t>penalties, max loan amount</a:t>
+            </a:r>
+            <a:endParaRPr lang="en-US" dirty="0" smtClean="0"/>
           </a:p>
           <a:p>
             <a:pPr marL="1371600" lvl="2" indent="-457200">
@@ -6820,7 +6867,11 @@
             </a:pPr>
             <a:r>
               <a:rPr lang="en-US" dirty="0" smtClean="0"/>
-              <a:t>% of pooled bank funds lent out</a:t>
+              <a:t>% of pooled bank funds lent </a:t>
+            </a:r>
+            <a:r>
+              <a:rPr lang="en-US" dirty="0" smtClean="0"/>
+              <a:t>out</a:t>
             </a:r>
             <a:endParaRPr lang="en-US" dirty="0"/>
           </a:p>
@@ -6831,10 +6882,68 @@
             </a:pPr>
             <a:r>
               <a:rPr lang="en-US" dirty="0" smtClean="0"/>
-              <a:t>ID </a:t>
-            </a:r>
-            <a:r>
-              <a:rPr lang="en-US" dirty="0"/>
+              <a:t>Bank contract (TBD)</a:t>
+            </a:r>
+          </a:p>
+          <a:p>
+            <a:pPr marL="1371600" lvl="2" indent="-514350">
+              <a:buFont typeface="+mj-lt"/>
+              <a:buAutoNum type="arabicPeriod"/>
+            </a:pPr>
+            <a:r>
+              <a:rPr lang="en-US" dirty="0" smtClean="0"/>
+              <a:t>Bank </a:t>
+            </a:r>
+            <a:r>
+              <a:rPr lang="en-US" dirty="0"/>
+              <a:t>structure &amp; Voting structure for </a:t>
+            </a:r>
+            <a:r>
+              <a:rPr lang="en-US" dirty="0" smtClean="0"/>
+              <a:t>members, loans</a:t>
+            </a:r>
+            <a:r>
+              <a:rPr lang="en-US" dirty="0" smtClean="0"/>
+              <a:t>, elders</a:t>
+            </a:r>
+          </a:p>
+          <a:p>
+            <a:pPr marL="1371600" lvl="2" indent="-514350">
+              <a:buFont typeface="+mj-lt"/>
+              <a:buAutoNum type="arabicPeriod"/>
+            </a:pPr>
+            <a:r>
+              <a:rPr lang="en-US" dirty="0" smtClean="0"/>
+              <a:t>Arrays not implemented yet in Solidity, use linked lists for list of bank members &amp; elders</a:t>
+            </a:r>
+          </a:p>
+          <a:p>
+            <a:pPr marL="1371600" lvl="2" indent="-514350">
+              <a:buFont typeface="+mj-lt"/>
+              <a:buAutoNum type="arabicPeriod"/>
+            </a:pPr>
+            <a:r>
+              <a:rPr lang="en-US" dirty="0" smtClean="0"/>
+              <a:t>Bank </a:t>
+            </a:r>
+            <a:r>
+              <a:rPr lang="en-US" dirty="0"/>
+              <a:t>bylaws, how to modify </a:t>
+            </a:r>
+            <a:r>
+              <a:rPr lang="en-US" dirty="0" smtClean="0"/>
+              <a:t>parameters</a:t>
+            </a:r>
+            <a:r>
+              <a:rPr lang="en-US" dirty="0" smtClean="0"/>
+              <a:t>, </a:t>
+            </a:r>
+            <a:r>
+              <a:rPr lang="en-US" dirty="0"/>
+              <a:t>framework for the entire </a:t>
+            </a:r>
+            <a:r>
+              <a:rPr lang="en-US" dirty="0" smtClean="0"/>
               <a:t>system</a:t>
             </a:r>
           </a:p>
@@ -6844,44 +6953,18 @@
               <a:buAutoNum type="arabicPeriod"/>
             </a:pPr>
             <a:r>
-              <a:rPr lang="en-US" dirty="0" smtClean="0"/>
-              <a:t>Bank </a:t>
-            </a:r>
-            <a:r>
-              <a:rPr lang="en-US" dirty="0"/>
-              <a:t>structure &amp; Voting structure for bank, elders</a:t>
-            </a:r>
-          </a:p>
-          <a:p>
-            <a:pPr marL="971550" lvl="1" indent="-514350">
+              <a:rPr lang="en-US" dirty="0"/>
+              <a:t>ID system</a:t>
+            </a:r>
+          </a:p>
+          <a:p>
+            <a:pPr marL="1371600" lvl="2" indent="-514350">
               <a:buFont typeface="+mj-lt"/>
               <a:buAutoNum type="arabicPeriod"/>
             </a:pPr>
             <a:r>
-              <a:rPr lang="en-US" dirty="0" smtClean="0"/>
-              <a:t>Voting </a:t>
-            </a:r>
-            <a:r>
-              <a:rPr lang="en-US" dirty="0"/>
-              <a:t>structure for social fund</a:t>
-            </a:r>
-          </a:p>
-          <a:p>
-            <a:pPr marL="971550" lvl="1" indent="-514350">
-              <a:buFont typeface="+mj-lt"/>
-              <a:buAutoNum type="arabicPeriod"/>
-            </a:pPr>
-            <a:r>
-              <a:rPr lang="en-US" dirty="0" smtClean="0"/>
-              <a:t>Bank </a:t>
-            </a:r>
-            <a:r>
-              <a:rPr lang="en-US" dirty="0"/>
-              <a:t>bylaws, how to modify them, framework for the entire </a:t>
-            </a:r>
-            <a:r>
-              <a:rPr lang="en-US" dirty="0" smtClean="0"/>
-              <a:t>system</a:t>
+              <a:rPr lang="en-US" dirty="0"/>
+              <a:t>Connect Ether address to Facebook/Google+?</a:t>
             </a:r>
             <a:endParaRPr lang="en-US" dirty="0"/>
           </a:p>
@@ -7080,9 +7163,69 @@
               <a:buChar char="•"/>
             </a:pPr>
             <a:r>
-              <a:rPr lang="en-US" dirty="0"/>
+              <a:rPr lang="en-US" sz="2400" dirty="0"/>
               <a:t>Proof of concept</a:t>
             </a:r>
+          </a:p>
+          <a:p>
+            <a:pPr lvl="1">
+              <a:buFont typeface="Arial" panose="020B0604020202020204" pitchFamily="34" charset="0"/>
+              <a:buChar char="•"/>
+            </a:pPr>
+            <a:r>
+              <a:rPr lang="en-US" sz="2400" dirty="0"/>
+              <a:t>Enhance coding skills</a:t>
+            </a:r>
+          </a:p>
+          <a:p>
+            <a:pPr lvl="1">
+              <a:buFont typeface="Arial" panose="020B0604020202020204" pitchFamily="34" charset="0"/>
+              <a:buChar char="•"/>
+            </a:pPr>
+            <a:r>
+              <a:rPr lang="en-US" sz="2400" dirty="0"/>
+              <a:t>Need help brainstorming the </a:t>
+            </a:r>
+            <a:r>
+              <a:rPr lang="en-US" sz="2400" dirty="0" err="1"/>
+              <a:t>Ethereum</a:t>
+            </a:r>
+            <a:r>
+              <a:rPr lang="en-US" sz="2400" dirty="0"/>
+              <a:t> architecture of this project &amp; with coding</a:t>
+            </a:r>
+          </a:p>
+          <a:p>
+            <a:pPr lvl="1">
+              <a:buFont typeface="Arial" panose="020B0604020202020204" pitchFamily="34" charset="0"/>
+              <a:buChar char="•"/>
+            </a:pPr>
+            <a:r>
+              <a:rPr lang="en-US" sz="2400" dirty="0"/>
+              <a:t>Anyone interested in this project – we can still collaborate and work on it after the course is over</a:t>
+            </a:r>
+          </a:p>
+          <a:p>
+            <a:pPr lvl="1">
+              <a:buFont typeface="Arial" panose="020B0604020202020204" pitchFamily="34" charset="0"/>
+              <a:buChar char="•"/>
+            </a:pPr>
+            <a:r>
+              <a:rPr lang="en-US" sz="2400" dirty="0">
+                <a:hlinkClick r:id="rId2"/>
+              </a:rPr>
+              <a:t>https://</a:t>
+            </a:r>
+            <a:r>
+              <a:rPr lang="en-US" sz="2400" dirty="0" smtClean="0">
+                <a:hlinkClick r:id="rId2"/>
+              </a:rPr>
+              <a:t>github.com/huang-pan/village-bank</a:t>
+            </a:r>
+            <a:r>
+              <a:rPr lang="en-US" sz="2400" dirty="0" smtClean="0"/>
+              <a:t> </a:t>
+            </a:r>
             <a:endParaRPr lang="en-US" sz="2400" dirty="0"/>
           </a:p>
           <a:p>
@@ -7091,18 +7234,15 @@
               <a:buChar char="•"/>
             </a:pPr>
             <a:r>
-              <a:rPr lang="en-US" dirty="0"/>
-              <a:t>Need help brainstorming the </a:t>
-            </a:r>
-            <a:r>
-              <a:rPr lang="en-US" dirty="0" err="1"/>
-              <a:t>Ethereum</a:t>
-            </a:r>
-            <a:r>
-              <a:rPr lang="en-US" dirty="0"/>
-              <a:t> architecture of this project &amp; with coding</a:t>
-            </a:r>
-            <a:endParaRPr lang="en-US" sz="2400" dirty="0"/>
+              <a:rPr lang="en-US" sz="2400" dirty="0">
+                <a:hlinkClick r:id="rId3"/>
+              </a:rPr>
+              <a:t>https://gitter.im/huang-pan/village-bank</a:t>
+            </a:r>
+            <a:r>
+              <a:rPr lang="en-US" sz="2400" dirty="0"/>
+              <a:t> </a:t>
+            </a:r>
           </a:p>
         </p:txBody>
       </p:sp>
@@ -8191,15 +8331,7 @@
             <a:pPr lvl="2"/>
             <a:r>
               <a:rPr lang="en-US" dirty="0"/>
-              <a:t>Visa, </a:t>
-            </a:r>
-            <a:r>
-              <a:rPr lang="en-US" dirty="0" smtClean="0"/>
-              <a:t>CARE, Barclays, etc. </a:t>
-            </a:r>
-            <a:r>
-              <a:rPr lang="en-US" dirty="0"/>
-              <a:t>already researching this</a:t>
+              <a:t>Visa, CARE, Barclays, etc. already researching this</a:t>
             </a:r>
             <a:endParaRPr lang="en-US" sz="2000" dirty="0"/>
           </a:p>
@@ -8210,60 +8342,28 @@
             </a:pPr>
             <a:r>
               <a:rPr lang="en-US" dirty="0"/>
-              <a:t>Helps the poorest of the poor, breaks the cycle of </a:t>
-            </a:r>
-            <a:r>
-              <a:rPr lang="en-US" dirty="0" smtClean="0"/>
-              <a:t>poverty</a:t>
+              <a:t>Helps the poorest of the poor, breaks the cycle of poverty</a:t>
             </a:r>
           </a:p>
           <a:p>
             <a:pPr lvl="2"/>
             <a:r>
               <a:rPr lang="en-US" sz="2000" dirty="0"/>
-              <a:t>~</a:t>
-            </a:r>
-            <a:r>
-              <a:rPr lang="en-US" sz="2000" dirty="0" smtClean="0"/>
-              <a:t>2.5 billion people globally don’t have access to bank accounts, insurance</a:t>
+              <a:t>~2.5 billion people globally don’t have access to bank accounts, insurance</a:t>
             </a:r>
           </a:p>
           <a:p>
             <a:pPr lvl="2"/>
             <a:r>
               <a:rPr lang="en-US" sz="2000" dirty="0"/>
-              <a:t>In most developing countries, </a:t>
-            </a:r>
-            <a:r>
-              <a:rPr lang="en-US" sz="2000" dirty="0" smtClean="0"/>
-              <a:t>&gt; 2/3 of </a:t>
-            </a:r>
+              <a:t>In most developing countries, &gt; 2/3 of the adult population has no access to formal financial services</a:t>
+            </a:r>
+          </a:p>
+          <a:p>
+            <a:pPr lvl="2"/>
             <a:r>
               <a:rPr lang="en-US" sz="2000" dirty="0"/>
-              <a:t>the adult population has no access to formal financial </a:t>
-            </a:r>
-            <a:r>
-              <a:rPr lang="en-US" sz="2000" dirty="0" smtClean="0"/>
-              <a:t>services</a:t>
-            </a:r>
-          </a:p>
-          <a:p>
-            <a:pPr lvl="2"/>
-            <a:r>
-              <a:rPr lang="en-US" sz="2000" dirty="0" smtClean="0"/>
-              <a:t>Exclusion </a:t>
-            </a:r>
-            <a:r>
-              <a:rPr lang="en-US" sz="2000" dirty="0"/>
-              <a:t>typically highest amongst women, youth and </a:t>
-            </a:r>
-            <a:r>
-              <a:rPr lang="en-US" sz="2000" dirty="0" smtClean="0"/>
-              <a:t>the very </a:t>
-            </a:r>
-            <a:r>
-              <a:rPr lang="en-US" sz="2000" dirty="0"/>
-              <a:t>poorest segments of </a:t>
+              <a:t>Exclusion typically highest amongst women, youth and the very poorest segments of </a:t>
             </a:r>
             <a:r>
               <a:rPr lang="en-US" sz="2000" dirty="0" smtClean="0"/>
@@ -8507,7 +8607,7 @@
         </p:spPr>
         <p:txBody>
           <a:bodyPr>
-            <a:normAutofit/>
+            <a:noAutofit/>
           </a:bodyPr>
           <a:lstStyle/>
           <a:p>
@@ -8516,7 +8616,7 @@
               <a:buChar char="•"/>
             </a:pPr>
             <a:r>
-              <a:rPr lang="en-US" sz="2000" dirty="0"/>
+              <a:rPr lang="en-US" sz="2200" dirty="0"/>
               <a:t>Globally, 20% of unbanked people have identified distance as a key barrier to financial inclusion</a:t>
             </a:r>
           </a:p>
@@ -8526,7 +8626,7 @@
               <a:buChar char="•"/>
             </a:pPr>
             <a:r>
-              <a:rPr lang="en-US" sz="2000" dirty="0"/>
+              <a:rPr lang="en-US" sz="2200" dirty="0"/>
               <a:t>In six out of 11 countries there are five or fewer bank branches per 100,000 people</a:t>
             </a:r>
           </a:p>
@@ -8536,7 +8636,7 @@
               <a:buChar char="•"/>
             </a:pPr>
             <a:r>
-              <a:rPr lang="en-US" sz="2000" dirty="0"/>
+              <a:rPr lang="en-US" sz="2200" dirty="0"/>
               <a:t>In Kenya, the average distance of people from their nearest bank branch is 19 km</a:t>
             </a:r>
           </a:p>
@@ -8546,39 +8646,35 @@
               <a:buChar char="•"/>
             </a:pPr>
             <a:r>
-              <a:rPr lang="en-US" sz="2000" dirty="0"/>
+              <a:rPr lang="en-US" sz="2200" dirty="0"/>
               <a:t>Solution: mobile banking</a:t>
             </a:r>
           </a:p>
           <a:p>
             <a:pPr lvl="2"/>
             <a:r>
-              <a:rPr lang="en-US" sz="1600" dirty="0"/>
+              <a:rPr lang="en-US" sz="2200" dirty="0"/>
               <a:t>Lowest Common Denominator: feature phone banking via SMS</a:t>
             </a:r>
           </a:p>
           <a:p>
             <a:pPr lvl="2"/>
             <a:r>
-              <a:rPr lang="en-US" sz="1600" dirty="0"/>
+              <a:rPr lang="en-US" sz="2200" dirty="0"/>
               <a:t>Proof of Concept already established via CARE’s pilot </a:t>
             </a:r>
             <a:r>
-              <a:rPr lang="en-US" sz="1600" dirty="0" smtClean="0"/>
+              <a:rPr lang="en-US" sz="2200" dirty="0" smtClean="0"/>
               <a:t>initiatives</a:t>
             </a:r>
           </a:p>
           <a:p>
             <a:pPr lvl="2"/>
             <a:r>
-              <a:rPr lang="en-US" sz="1600" dirty="0" smtClean="0"/>
-              <a:t>Demand for pilot </a:t>
-            </a:r>
-            <a:r>
-              <a:rPr lang="en-US" sz="1600" smtClean="0"/>
-              <a:t>initiatives strong</a:t>
-            </a:r>
-            <a:endParaRPr lang="en-US" sz="1600" dirty="0"/>
+              <a:rPr lang="en-US" sz="2200" dirty="0" smtClean="0"/>
+              <a:t>Demand for pilot initiatives strong</a:t>
+            </a:r>
+            <a:endParaRPr lang="en-US" sz="2200" dirty="0"/>
           </a:p>
         </p:txBody>
       </p:sp>

</xml_diff>

<commit_message>
updated village bank code; still debugging
</commit_message>
<xml_diff>
--- a/Village Bank.pptx
+++ b/Village Bank.pptx
@@ -3367,23 +3367,21 @@
             </a:r>
             <a:r>
               <a:rPr lang="en-US" sz="2000" dirty="0"/>
-              <a:t> accounts on a weekly basis to store cash that otherwise would have remained in the group’s box </a:t>
+              <a:t> accounts on a weekly basis to store cash that otherwise would have remained in the group’s </a:t>
+            </a:r>
+            <a:r>
+              <a:rPr lang="en-US" sz="2000" dirty="0" smtClean="0"/>
+              <a:t>box. They </a:t>
+            </a:r>
+            <a:r>
+              <a:rPr lang="en-US" sz="2000" dirty="0"/>
+              <a:t>viewed this as a more secure option than leaving the funds in the safe </a:t>
+            </a:r>
+            <a:r>
+              <a:rPr lang="en-US" sz="2000" dirty="0" smtClean="0"/>
+              <a:t>box.</a:t>
             </a:r>
             <a:endParaRPr lang="en-US" sz="2000" dirty="0" smtClean="0"/>
-          </a:p>
-          <a:p>
-            <a:pPr lvl="1">
-              <a:buFont typeface="Arial" panose="020B0604020202020204" pitchFamily="34" charset="0"/>
-              <a:buChar char="•"/>
-            </a:pPr>
-            <a:r>
-              <a:rPr lang="en-US" sz="2000" dirty="0"/>
-              <a:t>They viewed this as a more secure option than leaving the funds in the safe </a:t>
-            </a:r>
-            <a:r>
-              <a:rPr lang="en-US" sz="2000" dirty="0" smtClean="0"/>
-              <a:t>box</a:t>
-            </a:r>
           </a:p>
           <a:p>
             <a:pPr lvl="1">
@@ -3489,7 +3487,7 @@
         <p:spPr/>
         <p:txBody>
           <a:bodyPr>
-            <a:normAutofit fontScale="85000" lnSpcReduction="20000"/>
+            <a:normAutofit fontScale="77500" lnSpcReduction="20000"/>
           </a:bodyPr>
           <a:lstStyle/>
           <a:p>
@@ -3603,9 +3601,49 @@
             <a:pPr lvl="2"/>
             <a:r>
               <a:rPr lang="en-US" dirty="0"/>
-              <a:t>Use Facebook, Google+ as ID</a:t>
-            </a:r>
-            <a:endParaRPr lang="en-US" sz="2000" dirty="0"/>
+              <a:t>Use Facebook, Google+ as </a:t>
+            </a:r>
+            <a:r>
+              <a:rPr lang="en-US" dirty="0" smtClean="0"/>
+              <a:t>ID</a:t>
+            </a:r>
+          </a:p>
+          <a:p>
+            <a:pPr lvl="3"/>
+            <a:r>
+              <a:rPr lang="en-US" sz="1400" dirty="0" smtClean="0"/>
+              <a:t>Google Loon </a:t>
+            </a:r>
+            <a:r>
+              <a:rPr lang="en-US" sz="1400" dirty="0"/>
+              <a:t>will - "deploy more than 100,000 balloons in the stratosphere to provide high-speed Internet to regions without </a:t>
+            </a:r>
+            <a:r>
+              <a:rPr lang="en-US" sz="1400" dirty="0" smtClean="0"/>
+              <a:t>it“:  an extra 3.5 billion people on the internet</a:t>
+            </a:r>
+          </a:p>
+          <a:p>
+            <a:pPr lvl="3"/>
+            <a:r>
+              <a:rPr lang="en-US" sz="1600" dirty="0" smtClean="0">
+                <a:hlinkClick r:id="rId4"/>
+              </a:rPr>
+              <a:t>https</a:t>
+            </a:r>
+            <a:r>
+              <a:rPr lang="en-US" sz="1600" dirty="0">
+                <a:hlinkClick r:id="rId4"/>
+              </a:rPr>
+              <a:t>://www.reddit.com/r/Futurology/comments/2y1y3c/google_loon_will_deploy_more_than_100000_balloons/?</a:t>
+            </a:r>
+            <a:r>
+              <a:rPr lang="en-US" sz="1600" dirty="0" smtClean="0">
+                <a:hlinkClick r:id="rId4"/>
+              </a:rPr>
+              <a:t>sort=confidence</a:t>
+            </a:r>
+            <a:endParaRPr lang="en-US" sz="1600" dirty="0"/>
           </a:p>
           <a:p>
             <a:pPr lvl="1">
@@ -6594,7 +6632,7 @@
         <p:spPr/>
         <p:txBody>
           <a:bodyPr>
-            <a:normAutofit lnSpcReduction="10000"/>
+            <a:normAutofit fontScale="92500" lnSpcReduction="10000"/>
           </a:bodyPr>
           <a:lstStyle/>
           <a:p>
@@ -6664,12 +6702,24 @@
               <a:t>Use your phone as your wallet – </a:t>
             </a:r>
             <a:r>
-              <a:rPr lang="en-US" dirty="0" err="1"/>
+              <a:rPr lang="en-US" dirty="0" err="1" smtClean="0"/>
               <a:t>Mpesa</a:t>
             </a:r>
             <a:r>
               <a:rPr lang="en-US" dirty="0"/>
-              <a:t>?</a:t>
+              <a:t> </a:t>
+            </a:r>
+            <a:r>
+              <a:rPr lang="en-US" dirty="0" smtClean="0"/>
+              <a:t>solves last mile problem (see </a:t>
+            </a:r>
+            <a:r>
+              <a:rPr lang="en-US" dirty="0" err="1" smtClean="0"/>
+              <a:t>BitPesa</a:t>
+            </a:r>
+            <a:r>
+              <a:rPr lang="en-US" dirty="0" smtClean="0"/>
+              <a:t>)</a:t>
             </a:r>
             <a:endParaRPr lang="en-US" sz="2000" dirty="0"/>
           </a:p>
@@ -6820,7 +6870,11 @@
             </a:r>
             <a:r>
               <a:rPr lang="en-US" dirty="0"/>
-              <a:t>structure (savings accounts, loan accounts, pooled bank funds, </a:t>
+              <a:t>structure (savings accounts, loan accounts, pooled bank </a:t>
+            </a:r>
+            <a:r>
+              <a:rPr lang="en-US" dirty="0" smtClean="0"/>
+              <a:t>funds/bank reserve, </a:t>
             </a:r>
             <a:r>
               <a:rPr lang="en-US" dirty="0" err="1"/>
@@ -6847,18 +6901,17 @@
               <a:buAutoNum type="arabicPeriod"/>
             </a:pPr>
             <a:r>
-              <a:rPr lang="en-US" dirty="0"/>
-              <a:t>Loan payback </a:t>
-            </a:r>
-            <a:r>
-              <a:rPr lang="en-US" dirty="0" smtClean="0"/>
-              <a:t>periods &amp; </a:t>
-            </a:r>
-            <a:r>
-              <a:rPr lang="en-US" dirty="0" smtClean="0"/>
-              <a:t>penalties, max loan amount</a:t>
-            </a:r>
-            <a:endParaRPr lang="en-US" dirty="0" smtClean="0"/>
+              <a:rPr lang="en-US" smtClean="0"/>
+              <a:t>Loan </a:t>
+            </a:r>
+            <a:r>
+              <a:rPr lang="en-US" dirty="0"/>
+              <a:t>payback </a:t>
+            </a:r>
+            <a:r>
+              <a:rPr lang="en-US" dirty="0" smtClean="0"/>
+              <a:t>periods &amp; penalties, max loan amount</a:t>
+            </a:r>
           </a:p>
           <a:p>
             <a:pPr marL="1371600" lvl="2" indent="-457200">
@@ -6867,13 +6920,16 @@
             </a:pPr>
             <a:r>
               <a:rPr lang="en-US" dirty="0" smtClean="0"/>
-              <a:t>% of pooled bank funds lent </a:t>
-            </a:r>
-            <a:r>
-              <a:rPr lang="en-US" dirty="0" smtClean="0"/>
-              <a:t>out</a:t>
-            </a:r>
-            <a:endParaRPr lang="en-US" dirty="0"/>
+              <a:t>Reserve ratio: % </a:t>
+            </a:r>
+            <a:r>
+              <a:rPr lang="en-US" dirty="0" smtClean="0"/>
+              <a:t>of pooled bank funds lent </a:t>
+            </a:r>
+            <a:r>
+              <a:rPr lang="en-US" dirty="0" smtClean="0"/>
+              <a:t>out (cap injection ok)</a:t>
+            </a:r>
           </a:p>
           <a:p>
             <a:pPr marL="971550" lvl="1" indent="-514350">
@@ -6900,11 +6956,7 @@
             </a:r>
             <a:r>
               <a:rPr lang="en-US" dirty="0" smtClean="0"/>
-              <a:t>members, loans</a:t>
-            </a:r>
-            <a:r>
-              <a:rPr lang="en-US" dirty="0" smtClean="0"/>
-              <a:t>, elders</a:t>
+              <a:t>members, loans, elders</a:t>
             </a:r>
           </a:p>
           <a:p>
@@ -6932,11 +6984,7 @@
             </a:r>
             <a:r>
               <a:rPr lang="en-US" dirty="0" smtClean="0"/>
-              <a:t>parameters</a:t>
-            </a:r>
-            <a:r>
-              <a:rPr lang="en-US" dirty="0" smtClean="0"/>
-              <a:t>, </a:t>
+              <a:t>parameters, </a:t>
             </a:r>
             <a:r>
               <a:rPr lang="en-US" dirty="0"/>
@@ -6954,8 +7002,13 @@
             </a:pPr>
             <a:r>
               <a:rPr lang="en-US" dirty="0"/>
-              <a:t>ID system</a:t>
-            </a:r>
+              <a:t>ID </a:t>
+            </a:r>
+            <a:r>
+              <a:rPr lang="en-US" dirty="0" smtClean="0"/>
+              <a:t>system; multiple banks</a:t>
+            </a:r>
+            <a:endParaRPr lang="en-US" dirty="0"/>
           </a:p>
           <a:p>
             <a:pPr marL="1371600" lvl="2" indent="-514350">
@@ -6964,7 +7017,11 @@
             </a:pPr>
             <a:r>
               <a:rPr lang="en-US" dirty="0"/>
-              <a:t>Connect Ether address to Facebook/Google+?</a:t>
+              <a:t>Connect Ether address to Facebook/Google</a:t>
+            </a:r>
+            <a:r>
+              <a:rPr lang="en-US" dirty="0" smtClean="0"/>
+              <a:t>+?</a:t>
             </a:r>
             <a:endParaRPr lang="en-US" dirty="0"/>
           </a:p>
@@ -7202,19 +7259,29 @@
             </a:pPr>
             <a:r>
               <a:rPr lang="en-US" sz="2400" dirty="0"/>
-              <a:t>Anyone interested in this project – we can still collaborate and work on it after the course is over</a:t>
-            </a:r>
-          </a:p>
-          <a:p>
-            <a:pPr lvl="1">
-              <a:buFont typeface="Arial" panose="020B0604020202020204" pitchFamily="34" charset="0"/>
-              <a:buChar char="•"/>
-            </a:pPr>
+              <a:t>Anyone interested in this project – we can still collaborate and work on it after the course is </a:t>
+            </a:r>
+            <a:r>
+              <a:rPr lang="en-US" sz="2400" dirty="0" smtClean="0"/>
+              <a:t>over</a:t>
+            </a:r>
+          </a:p>
+          <a:p>
+            <a:pPr lvl="1">
+              <a:buFont typeface="Arial" panose="020B0604020202020204" pitchFamily="34" charset="0"/>
+              <a:buChar char="•"/>
+            </a:pPr>
+            <a:r>
+              <a:rPr lang="en-US" sz="2400" dirty="0" smtClean="0">
+                <a:hlinkClick r:id="rId2"/>
+              </a:rPr>
+              <a:t>https</a:t>
+            </a:r>
             <a:r>
               <a:rPr lang="en-US" sz="2400" dirty="0">
                 <a:hlinkClick r:id="rId2"/>
               </a:rPr>
-              <a:t>https://</a:t>
+              <a:t>://</a:t>
             </a:r>
             <a:r>
               <a:rPr lang="en-US" sz="2400" dirty="0" smtClean="0">
@@ -8305,7 +8372,7 @@
         </p:spPr>
         <p:txBody>
           <a:bodyPr>
-            <a:normAutofit/>
+            <a:normAutofit lnSpcReduction="10000"/>
           </a:bodyPr>
           <a:lstStyle/>
           <a:p>
@@ -8333,7 +8400,13 @@
               <a:rPr lang="en-US" dirty="0"/>
               <a:t>Visa, CARE, Barclays, etc. already researching this</a:t>
             </a:r>
-            <a:endParaRPr lang="en-US" sz="2000" dirty="0"/>
+          </a:p>
+          <a:p>
+            <a:pPr lvl="2"/>
+            <a:r>
+              <a:rPr lang="en-US" sz="2000" dirty="0"/>
+              <a:t>Developing countries leapfrog technologies; no old infrastructure</a:t>
+            </a:r>
           </a:p>
           <a:p>
             <a:pPr lvl="1">

</xml_diff>

<commit_message>
updated notes on ethereum
</commit_message>
<xml_diff>
--- a/Village Bank.pptx
+++ b/Village Bank.pptx
@@ -6901,7 +6901,7 @@
               <a:buAutoNum type="arabicPeriod"/>
             </a:pPr>
             <a:r>
-              <a:rPr lang="en-US" smtClean="0"/>
+              <a:rPr lang="en-US" dirty="0" smtClean="0"/>
               <a:t>Loan </a:t>
             </a:r>
             <a:r>
@@ -7240,17 +7240,30 @@
               <a:buChar char="•"/>
             </a:pPr>
             <a:r>
-              <a:rPr lang="en-US" sz="2400" dirty="0"/>
-              <a:t>Need help brainstorming the </a:t>
-            </a:r>
-            <a:r>
-              <a:rPr lang="en-US" sz="2400" dirty="0" err="1"/>
+              <a:rPr lang="en-US" sz="2400" dirty="0" smtClean="0"/>
+              <a:t>Learning </a:t>
+            </a:r>
+            <a:r>
+              <a:rPr lang="en-US" sz="2400" dirty="0" err="1" smtClean="0"/>
               <a:t>Ethereum</a:t>
             </a:r>
-            <a:r>
-              <a:rPr lang="en-US" sz="2400" dirty="0"/>
-              <a:t> architecture of this project &amp; with coding</a:t>
-            </a:r>
+            <a:endParaRPr lang="en-US" sz="2400" dirty="0" smtClean="0"/>
+          </a:p>
+          <a:p>
+            <a:pPr lvl="2"/>
+            <a:r>
+              <a:rPr lang="en-US" sz="2000" dirty="0" smtClean="0"/>
+              <a:t>Not ready yet: no arrays, no </a:t>
+            </a:r>
+            <a:r>
+              <a:rPr lang="en-US" sz="2000" dirty="0" err="1" smtClean="0"/>
+              <a:t>ethereum</a:t>
+            </a:r>
+            <a:r>
+              <a:rPr lang="en-US" sz="2000" dirty="0" smtClean="0"/>
+              <a:t> node.js server, Mix IDE buggy &amp; crashes</a:t>
+            </a:r>
+            <a:endParaRPr lang="en-US" sz="2000" dirty="0"/>
           </a:p>
           <a:p>
             <a:pPr lvl="1">

</xml_diff>